<commit_message>
changed title to past-present-future
</commit_message>
<xml_diff>
--- a/P1_past_OddBall_ToT.pptx
+++ b/P1_past_OddBall_ToT.pptx
@@ -7105,20 +7105,9 @@
           <a:lstStyle/>
           <a:p>
             <a:r>
-              <a:rPr lang="en-US" dirty="0"/>
-              <a:t>Spotting anomalies in large graphs:</a:t>
-            </a:r>
-            <a:br>
-              <a:rPr lang="en-US" dirty="0"/>
-            </a:br>
-            <a:r>
-              <a:rPr lang="en-US" dirty="0"/>
-              <a:t>Ten years later.</a:t>
-            </a:r>
-            <a:endParaRPr lang="en-US" dirty="0">
-              <a:ea typeface="ＭＳ Ｐゴシック" charset="-128"/>
-              <a:cs typeface="ＭＳ Ｐゴシック" charset="-128"/>
-            </a:endParaRPr>
+              <a:rPr lang="en-US"/>
+              <a:t>Anomaly detection in graphs - past, present and future.</a:t>
+            </a:r>
           </a:p>
         </p:txBody>
       </p:sp>
@@ -7347,14 +7336,14 @@
           </a:ln>
           <a:extLst>
             <a:ext uri="{909E8E84-426E-40dd-AFC4-6F175D3DCCD1}">
-              <a14:hiddenFill xmlns="" xmlns:a14="http://schemas.microsoft.com/office/drawing/2010/main">
+              <a14:hiddenFill xmlns:a14="http://schemas.microsoft.com/office/drawing/2010/main" xmlns="">
                 <a:solidFill>
                   <a:srgbClr val="FFFFFF"/>
                 </a:solidFill>
               </a14:hiddenFill>
             </a:ext>
             <a:ext uri="{91240B29-F687-4f45-9708-019B960494DF}">
-              <a14:hiddenLine xmlns="" xmlns:a14="http://schemas.microsoft.com/office/drawing/2010/main" w="9525">
+              <a14:hiddenLine xmlns:a14="http://schemas.microsoft.com/office/drawing/2010/main" xmlns="" w="9525">
                 <a:solidFill>
                   <a:srgbClr val="000000"/>
                 </a:solidFill>
@@ -7428,14 +7417,14 @@
           </a:ln>
           <a:extLst>
             <a:ext uri="{909E8E84-426E-40dd-AFC4-6F175D3DCCD1}">
-              <a14:hiddenFill xmlns="" xmlns:a14="http://schemas.microsoft.com/office/drawing/2010/main">
+              <a14:hiddenFill xmlns:a14="http://schemas.microsoft.com/office/drawing/2010/main" xmlns="">
                 <a:solidFill>
                   <a:srgbClr val="FFFFFF"/>
                 </a:solidFill>
               </a14:hiddenFill>
             </a:ext>
             <a:ext uri="{91240B29-F687-4f45-9708-019B960494DF}">
-              <a14:hiddenLine xmlns="" xmlns:a14="http://schemas.microsoft.com/office/drawing/2010/main" w="9525">
+              <a14:hiddenLine xmlns:a14="http://schemas.microsoft.com/office/drawing/2010/main" xmlns="" w="9525">
                 <a:solidFill>
                   <a:srgbClr val="000000"/>
                 </a:solidFill>
@@ -7482,14 +7471,14 @@
           </a:ln>
           <a:extLst>
             <a:ext uri="{909E8E84-426E-40dd-AFC4-6F175D3DCCD1}">
-              <a14:hiddenFill xmlns="" xmlns:a14="http://schemas.microsoft.com/office/drawing/2010/main">
+              <a14:hiddenFill xmlns:a14="http://schemas.microsoft.com/office/drawing/2010/main" xmlns="">
                 <a:solidFill>
                   <a:srgbClr val="FFFFFF"/>
                 </a:solidFill>
               </a14:hiddenFill>
             </a:ext>
             <a:ext uri="{91240B29-F687-4f45-9708-019B960494DF}">
-              <a14:hiddenLine xmlns="" xmlns:a14="http://schemas.microsoft.com/office/drawing/2010/main" w="9525">
+              <a14:hiddenLine xmlns:a14="http://schemas.microsoft.com/office/drawing/2010/main" xmlns="" w="9525">
                 <a:solidFill>
                   <a:srgbClr val="000000"/>
                 </a:solidFill>
@@ -8155,14 +8144,14 @@
           </a:ln>
           <a:extLst>
             <a:ext uri="{909E8E84-426E-40dd-AFC4-6F175D3DCCD1}">
-              <a14:hiddenFill xmlns="" xmlns:a14="http://schemas.microsoft.com/office/drawing/2010/main">
+              <a14:hiddenFill xmlns:a14="http://schemas.microsoft.com/office/drawing/2010/main" xmlns="">
                 <a:solidFill>
                   <a:srgbClr val="FFFFFF"/>
                 </a:solidFill>
               </a14:hiddenFill>
             </a:ext>
             <a:ext uri="{91240B29-F687-4f45-9708-019B960494DF}">
-              <a14:hiddenLine xmlns="" xmlns:a14="http://schemas.microsoft.com/office/drawing/2010/main" w="9525">
+              <a14:hiddenLine xmlns:a14="http://schemas.microsoft.com/office/drawing/2010/main" xmlns="" w="9525">
                 <a:solidFill>
                   <a:srgbClr val="000000"/>
                 </a:solidFill>
@@ -8236,14 +8225,14 @@
           </a:ln>
           <a:extLst>
             <a:ext uri="{909E8E84-426E-40dd-AFC4-6F175D3DCCD1}">
-              <a14:hiddenFill xmlns="" xmlns:a14="http://schemas.microsoft.com/office/drawing/2010/main">
+              <a14:hiddenFill xmlns:a14="http://schemas.microsoft.com/office/drawing/2010/main" xmlns="">
                 <a:solidFill>
                   <a:srgbClr val="FFFFFF"/>
                 </a:solidFill>
               </a14:hiddenFill>
             </a:ext>
             <a:ext uri="{91240B29-F687-4f45-9708-019B960494DF}">
-              <a14:hiddenLine xmlns="" xmlns:a14="http://schemas.microsoft.com/office/drawing/2010/main" w="9525">
+              <a14:hiddenLine xmlns:a14="http://schemas.microsoft.com/office/drawing/2010/main" xmlns="" w="9525">
                 <a:solidFill>
                   <a:srgbClr val="000000"/>
                 </a:solidFill>
@@ -8290,14 +8279,14 @@
           </a:ln>
           <a:extLst>
             <a:ext uri="{909E8E84-426E-40dd-AFC4-6F175D3DCCD1}">
-              <a14:hiddenFill xmlns="" xmlns:a14="http://schemas.microsoft.com/office/drawing/2010/main">
+              <a14:hiddenFill xmlns:a14="http://schemas.microsoft.com/office/drawing/2010/main" xmlns="">
                 <a:solidFill>
                   <a:srgbClr val="FFFFFF"/>
                 </a:solidFill>
               </a14:hiddenFill>
             </a:ext>
             <a:ext uri="{91240B29-F687-4f45-9708-019B960494DF}">
-              <a14:hiddenLine xmlns="" xmlns:a14="http://schemas.microsoft.com/office/drawing/2010/main" w="9525">
+              <a14:hiddenLine xmlns:a14="http://schemas.microsoft.com/office/drawing/2010/main" xmlns="" w="9525">
                 <a:solidFill>
                   <a:srgbClr val="000000"/>
                 </a:solidFill>
@@ -9522,14 +9511,14 @@
           </a:ln>
           <a:extLst>
             <a:ext uri="{909E8E84-426E-40dd-AFC4-6F175D3DCCD1}">
-              <a14:hiddenFill xmlns="" xmlns:a14="http://schemas.microsoft.com/office/drawing/2010/main">
+              <a14:hiddenFill xmlns:a14="http://schemas.microsoft.com/office/drawing/2010/main" xmlns="">
                 <a:solidFill>
                   <a:srgbClr val="FFFFFF"/>
                 </a:solidFill>
               </a14:hiddenFill>
             </a:ext>
             <a:ext uri="{91240B29-F687-4f45-9708-019B960494DF}">
-              <a14:hiddenLine xmlns="" xmlns:a14="http://schemas.microsoft.com/office/drawing/2010/main" w="9525">
+              <a14:hiddenLine xmlns:a14="http://schemas.microsoft.com/office/drawing/2010/main" xmlns="" w="9525">
                 <a:solidFill>
                   <a:srgbClr val="000000"/>
                 </a:solidFill>
@@ -10914,14 +10903,14 @@
             </a:ln>
             <a:extLst>
               <a:ext uri="{909E8E84-426E-40dd-AFC4-6F175D3DCCD1}">
-                <a14:hiddenFill xmlns="" xmlns:a14="http://schemas.microsoft.com/office/drawing/2010/main">
+                <a14:hiddenFill xmlns:a14="http://schemas.microsoft.com/office/drawing/2010/main" xmlns="">
                   <a:solidFill>
                     <a:srgbClr val="FFFFFF"/>
                   </a:solidFill>
                 </a14:hiddenFill>
               </a:ext>
               <a:ext uri="{91240B29-F687-4f45-9708-019B960494DF}">
-                <a14:hiddenLine xmlns="" xmlns:a14="http://schemas.microsoft.com/office/drawing/2010/main" w="9525">
+                <a14:hiddenLine xmlns:a14="http://schemas.microsoft.com/office/drawing/2010/main" xmlns="" w="9525">
                   <a:solidFill>
                     <a:srgbClr val="000000"/>
                   </a:solidFill>
@@ -10968,14 +10957,14 @@
             </a:ln>
             <a:extLst>
               <a:ext uri="{909E8E84-426E-40dd-AFC4-6F175D3DCCD1}">
-                <a14:hiddenFill xmlns="" xmlns:a14="http://schemas.microsoft.com/office/drawing/2010/main">
+                <a14:hiddenFill xmlns:a14="http://schemas.microsoft.com/office/drawing/2010/main" xmlns="">
                   <a:solidFill>
                     <a:srgbClr val="FFFFFF"/>
                   </a:solidFill>
                 </a14:hiddenFill>
               </a:ext>
               <a:ext uri="{91240B29-F687-4f45-9708-019B960494DF}">
-                <a14:hiddenLine xmlns="" xmlns:a14="http://schemas.microsoft.com/office/drawing/2010/main" w="9525">
+                <a14:hiddenLine xmlns:a14="http://schemas.microsoft.com/office/drawing/2010/main" xmlns="" w="9525">
                   <a:solidFill>
                     <a:srgbClr val="000000"/>
                   </a:solidFill>
@@ -11022,14 +11011,14 @@
             </a:ln>
             <a:extLst>
               <a:ext uri="{909E8E84-426E-40dd-AFC4-6F175D3DCCD1}">
-                <a14:hiddenFill xmlns="" xmlns:a14="http://schemas.microsoft.com/office/drawing/2010/main">
+                <a14:hiddenFill xmlns:a14="http://schemas.microsoft.com/office/drawing/2010/main" xmlns="">
                   <a:solidFill>
                     <a:srgbClr val="FFFFFF"/>
                   </a:solidFill>
                 </a14:hiddenFill>
               </a:ext>
               <a:ext uri="{91240B29-F687-4f45-9708-019B960494DF}">
-                <a14:hiddenLine xmlns="" xmlns:a14="http://schemas.microsoft.com/office/drawing/2010/main" w="9525">
+                <a14:hiddenLine xmlns:a14="http://schemas.microsoft.com/office/drawing/2010/main" xmlns="" w="9525">
                   <a:solidFill>
                     <a:srgbClr val="000000"/>
                   </a:solidFill>
@@ -11076,14 +11065,14 @@
             </a:ln>
             <a:extLst>
               <a:ext uri="{909E8E84-426E-40dd-AFC4-6F175D3DCCD1}">
-                <a14:hiddenFill xmlns="" xmlns:a14="http://schemas.microsoft.com/office/drawing/2010/main">
+                <a14:hiddenFill xmlns:a14="http://schemas.microsoft.com/office/drawing/2010/main" xmlns="">
                   <a:solidFill>
                     <a:srgbClr val="FFFFFF"/>
                   </a:solidFill>
                 </a14:hiddenFill>
               </a:ext>
               <a:ext uri="{91240B29-F687-4f45-9708-019B960494DF}">
-                <a14:hiddenLine xmlns="" xmlns:a14="http://schemas.microsoft.com/office/drawing/2010/main" w="9525">
+                <a14:hiddenLine xmlns:a14="http://schemas.microsoft.com/office/drawing/2010/main" xmlns="" w="9525">
                   <a:solidFill>
                     <a:srgbClr val="000000"/>
                   </a:solidFill>
@@ -11130,14 +11119,14 @@
             </a:ln>
             <a:extLst>
               <a:ext uri="{909E8E84-426E-40dd-AFC4-6F175D3DCCD1}">
-                <a14:hiddenFill xmlns="" xmlns:a14="http://schemas.microsoft.com/office/drawing/2010/main">
+                <a14:hiddenFill xmlns:a14="http://schemas.microsoft.com/office/drawing/2010/main" xmlns="">
                   <a:solidFill>
                     <a:srgbClr val="FFFFFF"/>
                   </a:solidFill>
                 </a14:hiddenFill>
               </a:ext>
               <a:ext uri="{91240B29-F687-4f45-9708-019B960494DF}">
-                <a14:hiddenLine xmlns="" xmlns:a14="http://schemas.microsoft.com/office/drawing/2010/main" w="9525">
+                <a14:hiddenLine xmlns:a14="http://schemas.microsoft.com/office/drawing/2010/main" xmlns="" w="9525">
                   <a:solidFill>
                     <a:srgbClr val="000000"/>
                   </a:solidFill>
@@ -11184,14 +11173,14 @@
             </a:ln>
             <a:extLst>
               <a:ext uri="{909E8E84-426E-40dd-AFC4-6F175D3DCCD1}">
-                <a14:hiddenFill xmlns="" xmlns:a14="http://schemas.microsoft.com/office/drawing/2010/main">
+                <a14:hiddenFill xmlns:a14="http://schemas.microsoft.com/office/drawing/2010/main" xmlns="">
                   <a:solidFill>
                     <a:srgbClr val="FFFFFF"/>
                   </a:solidFill>
                 </a14:hiddenFill>
               </a:ext>
               <a:ext uri="{91240B29-F687-4f45-9708-019B960494DF}">
-                <a14:hiddenLine xmlns="" xmlns:a14="http://schemas.microsoft.com/office/drawing/2010/main" w="9525">
+                <a14:hiddenLine xmlns:a14="http://schemas.microsoft.com/office/drawing/2010/main" xmlns="" w="9525">
                   <a:solidFill>
                     <a:srgbClr val="000000"/>
                   </a:solidFill>
@@ -11238,14 +11227,14 @@
             </a:ln>
             <a:extLst>
               <a:ext uri="{909E8E84-426E-40dd-AFC4-6F175D3DCCD1}">
-                <a14:hiddenFill xmlns="" xmlns:a14="http://schemas.microsoft.com/office/drawing/2010/main">
+                <a14:hiddenFill xmlns:a14="http://schemas.microsoft.com/office/drawing/2010/main" xmlns="">
                   <a:solidFill>
                     <a:srgbClr val="FFFFFF"/>
                   </a:solidFill>
                 </a14:hiddenFill>
               </a:ext>
               <a:ext uri="{91240B29-F687-4f45-9708-019B960494DF}">
-                <a14:hiddenLine xmlns="" xmlns:a14="http://schemas.microsoft.com/office/drawing/2010/main" w="9525">
+                <a14:hiddenLine xmlns:a14="http://schemas.microsoft.com/office/drawing/2010/main" xmlns="" w="9525">
                   <a:solidFill>
                     <a:srgbClr val="000000"/>
                   </a:solidFill>
@@ -11292,14 +11281,14 @@
             </a:ln>
             <a:extLst>
               <a:ext uri="{909E8E84-426E-40dd-AFC4-6F175D3DCCD1}">
-                <a14:hiddenFill xmlns="" xmlns:a14="http://schemas.microsoft.com/office/drawing/2010/main">
+                <a14:hiddenFill xmlns:a14="http://schemas.microsoft.com/office/drawing/2010/main" xmlns="">
                   <a:solidFill>
                     <a:srgbClr val="FFFFFF"/>
                   </a:solidFill>
                 </a14:hiddenFill>
               </a:ext>
               <a:ext uri="{91240B29-F687-4f45-9708-019B960494DF}">
-                <a14:hiddenLine xmlns="" xmlns:a14="http://schemas.microsoft.com/office/drawing/2010/main" w="9525">
+                <a14:hiddenLine xmlns:a14="http://schemas.microsoft.com/office/drawing/2010/main" xmlns="" w="9525">
                   <a:solidFill>
                     <a:srgbClr val="000000"/>
                   </a:solidFill>
@@ -11858,14 +11847,14 @@
           </a:ln>
           <a:extLst>
             <a:ext uri="{909E8E84-426E-40dd-AFC4-6F175D3DCCD1}">
-              <a14:hiddenFill xmlns="" xmlns:a14="http://schemas.microsoft.com/office/drawing/2010/main">
+              <a14:hiddenFill xmlns:a14="http://schemas.microsoft.com/office/drawing/2010/main" xmlns="">
                 <a:solidFill>
                   <a:srgbClr val="FFFFFF"/>
                 </a:solidFill>
               </a14:hiddenFill>
             </a:ext>
             <a:ext uri="{91240B29-F687-4f45-9708-019B960494DF}">
-              <a14:hiddenLine xmlns="" xmlns:a14="http://schemas.microsoft.com/office/drawing/2010/main" w="9525">
+              <a14:hiddenLine xmlns:a14="http://schemas.microsoft.com/office/drawing/2010/main" xmlns="" w="9525">
                 <a:solidFill>
                   <a:srgbClr val="000000"/>
                 </a:solidFill>
@@ -12291,14 +12280,14 @@
           </a:ln>
           <a:extLst>
             <a:ext uri="{909E8E84-426E-40dd-AFC4-6F175D3DCCD1}">
-              <a14:hiddenFill xmlns="" xmlns:a14="http://schemas.microsoft.com/office/drawing/2010/main">
+              <a14:hiddenFill xmlns:a14="http://schemas.microsoft.com/office/drawing/2010/main" xmlns="">
                 <a:solidFill>
                   <a:srgbClr val="FFFFFF"/>
                 </a:solidFill>
               </a14:hiddenFill>
             </a:ext>
             <a:ext uri="{91240B29-F687-4f45-9708-019B960494DF}">
-              <a14:hiddenLine xmlns="" xmlns:a14="http://schemas.microsoft.com/office/drawing/2010/main" w="9525">
+              <a14:hiddenLine xmlns:a14="http://schemas.microsoft.com/office/drawing/2010/main" xmlns="" w="9525">
                 <a:solidFill>
                   <a:srgbClr val="000000"/>
                 </a:solidFill>
@@ -12345,14 +12334,14 @@
           </a:ln>
           <a:extLst>
             <a:ext uri="{909E8E84-426E-40dd-AFC4-6F175D3DCCD1}">
-              <a14:hiddenFill xmlns="" xmlns:a14="http://schemas.microsoft.com/office/drawing/2010/main">
+              <a14:hiddenFill xmlns:a14="http://schemas.microsoft.com/office/drawing/2010/main" xmlns="">
                 <a:solidFill>
                   <a:srgbClr val="FFFFFF"/>
                 </a:solidFill>
               </a14:hiddenFill>
             </a:ext>
             <a:ext uri="{91240B29-F687-4f45-9708-019B960494DF}">
-              <a14:hiddenLine xmlns="" xmlns:a14="http://schemas.microsoft.com/office/drawing/2010/main" w="9525">
+              <a14:hiddenLine xmlns:a14="http://schemas.microsoft.com/office/drawing/2010/main" xmlns="" w="9525">
                 <a:solidFill>
                   <a:srgbClr val="000000"/>
                 </a:solidFill>
@@ -12399,14 +12388,14 @@
           </a:ln>
           <a:extLst>
             <a:ext uri="{909E8E84-426E-40dd-AFC4-6F175D3DCCD1}">
-              <a14:hiddenFill xmlns="" xmlns:a14="http://schemas.microsoft.com/office/drawing/2010/main">
+              <a14:hiddenFill xmlns:a14="http://schemas.microsoft.com/office/drawing/2010/main" xmlns="">
                 <a:solidFill>
                   <a:srgbClr val="FFFFFF"/>
                 </a:solidFill>
               </a14:hiddenFill>
             </a:ext>
             <a:ext uri="{91240B29-F687-4f45-9708-019B960494DF}">
-              <a14:hiddenLine xmlns="" xmlns:a14="http://schemas.microsoft.com/office/drawing/2010/main" w="9525">
+              <a14:hiddenLine xmlns:a14="http://schemas.microsoft.com/office/drawing/2010/main" xmlns="" w="9525">
                 <a:solidFill>
                   <a:srgbClr val="000000"/>
                 </a:solidFill>
@@ -12453,14 +12442,14 @@
           </a:ln>
           <a:extLst>
             <a:ext uri="{909E8E84-426E-40dd-AFC4-6F175D3DCCD1}">
-              <a14:hiddenFill xmlns="" xmlns:a14="http://schemas.microsoft.com/office/drawing/2010/main">
+              <a14:hiddenFill xmlns:a14="http://schemas.microsoft.com/office/drawing/2010/main" xmlns="">
                 <a:solidFill>
                   <a:srgbClr val="FFFFFF"/>
                 </a:solidFill>
               </a14:hiddenFill>
             </a:ext>
             <a:ext uri="{91240B29-F687-4f45-9708-019B960494DF}">
-              <a14:hiddenLine xmlns="" xmlns:a14="http://schemas.microsoft.com/office/drawing/2010/main" w="9525">
+              <a14:hiddenLine xmlns:a14="http://schemas.microsoft.com/office/drawing/2010/main" xmlns="" w="9525">
                 <a:solidFill>
                   <a:srgbClr val="000000"/>
                 </a:solidFill>
@@ -12507,14 +12496,14 @@
           </a:ln>
           <a:extLst>
             <a:ext uri="{909E8E84-426E-40dd-AFC4-6F175D3DCCD1}">
-              <a14:hiddenFill xmlns="" xmlns:a14="http://schemas.microsoft.com/office/drawing/2010/main">
+              <a14:hiddenFill xmlns:a14="http://schemas.microsoft.com/office/drawing/2010/main" xmlns="">
                 <a:solidFill>
                   <a:srgbClr val="FFFFFF"/>
                 </a:solidFill>
               </a14:hiddenFill>
             </a:ext>
             <a:ext uri="{91240B29-F687-4f45-9708-019B960494DF}">
-              <a14:hiddenLine xmlns="" xmlns:a14="http://schemas.microsoft.com/office/drawing/2010/main" w="9525">
+              <a14:hiddenLine xmlns:a14="http://schemas.microsoft.com/office/drawing/2010/main" xmlns="" w="9525">
                 <a:solidFill>
                   <a:srgbClr val="000000"/>
                 </a:solidFill>

</xml_diff>